<commit_message>
Obhajoba: Doplnenie algoritmov, obrazky
</commit_message>
<xml_diff>
--- a/obhajoba/ifj_prezentacia.pptx
+++ b/obhajoba/ifj_prezentacia.pptx
@@ -221,7 +221,7 @@
             <a:fld id="{3842907C-D0AA-4C58-9F94-58B40AD65B29}" type="datetimeFigureOut">
               <a:rPr lang="en-US" smtClean="0"/>
               <a:pPr/>
-              <a:t>12/16/2014</a:t>
+              <a:t>12/17/2014</a:t>
             </a:fld>
             <a:endParaRPr lang="en-US"/>
           </a:p>
@@ -2247,10 +2247,9 @@
             <a:extLst/>
           </a:lstStyle>
           <a:p>
-            <a:fld id="{E6E13C79-1C97-4B32-B2AE-1A69C169643E}" type="datetime2">
+            <a:fld id="{86B9EEFF-CE9A-4029-A1BB-3F3A1D638561}" type="datetime2">
               <a:rPr lang="en-US" smtClean="0"/>
-              <a:pPr/>
-              <a:t>Tuesday, December 16, 2014</a:t>
+              <a:t>Thursday, December 18, 2014</a:t>
             </a:fld>
             <a:endParaRPr lang="en-US" dirty="0">
               <a:solidFill>
@@ -2459,10 +2458,9 @@
             <a:extLst/>
           </a:lstStyle>
           <a:p>
-            <a:fld id="{D10E14BF-C004-4398-9186-5EE680724D95}" type="datetime2">
+            <a:fld id="{588788DF-0A27-47E9-87BC-A68FB45FE7B2}" type="datetime2">
               <a:rPr lang="en-US" smtClean="0"/>
-              <a:pPr/>
-              <a:t>Tuesday, December 16, 2014</a:t>
+              <a:t>Thursday, December 18, 2014</a:t>
             </a:fld>
             <a:endParaRPr lang="en-US"/>
           </a:p>
@@ -2652,10 +2650,9 @@
             <a:extLst/>
           </a:lstStyle>
           <a:p>
-            <a:fld id="{D10E14BF-C004-4398-9186-5EE680724D95}" type="datetime2">
+            <a:fld id="{40EB8B4A-848A-43D8-BC3B-024D39A524F9}" type="datetime2">
               <a:rPr lang="en-US" smtClean="0"/>
-              <a:pPr/>
-              <a:t>Tuesday, December 16, 2014</a:t>
+              <a:t>Thursday, December 18, 2014</a:t>
             </a:fld>
             <a:endParaRPr lang="en-US"/>
           </a:p>
@@ -2810,10 +2807,9 @@
             <a:extLst/>
           </a:lstStyle>
           <a:p>
-            <a:fld id="{227FEF5B-F2CC-4EC5-8F1F-29A8BF9EFFA9}" type="datetime2">
+            <a:fld id="{8AFCA004-2BFA-4673-AB2A-116A5022D633}" type="datetime2">
               <a:rPr lang="en-US" smtClean="0"/>
-              <a:pPr/>
-              <a:t>Tuesday, December 16, 2014</a:t>
+              <a:t>Thursday, December 18, 2014</a:t>
             </a:fld>
             <a:endParaRPr lang="en-US"/>
           </a:p>
@@ -3067,10 +3063,9 @@
             <a:extLst/>
           </a:lstStyle>
           <a:p>
-            <a:fld id="{5F4709C1-563D-4D9C-B702-B64C84A5A174}" type="datetime2">
+            <a:fld id="{32EBD067-DB02-4415-9EB0-8DAF6EC90B4C}" type="datetime2">
               <a:rPr lang="en-US" smtClean="0"/>
-              <a:pPr/>
-              <a:t>Tuesday, December 16, 2014</a:t>
+              <a:t>Thursday, December 18, 2014</a:t>
             </a:fld>
             <a:endParaRPr lang="en-US"/>
           </a:p>
@@ -3478,10 +3473,9 @@
             <a:extLst/>
           </a:lstStyle>
           <a:p>
-            <a:fld id="{2E8303D9-A6EB-41FB-BF22-3F49E470997E}" type="datetime2">
+            <a:fld id="{1C204584-B191-48AE-8CD1-9981E18E14E7}" type="datetime2">
               <a:rPr lang="en-US" smtClean="0"/>
-              <a:pPr/>
-              <a:t>Tuesday, December 16, 2014</a:t>
+              <a:t>Thursday, December 18, 2014</a:t>
             </a:fld>
             <a:endParaRPr lang="en-US"/>
           </a:p>
@@ -3926,10 +3920,9 @@
             <a:extLst/>
           </a:lstStyle>
           <a:p>
-            <a:fld id="{89BB0534-5698-4F62-9CFE-5DE61A073E78}" type="datetime2">
+            <a:fld id="{14889D78-3CF7-4006-ACAB-6DC0A32767AA}" type="datetime2">
               <a:rPr lang="en-US" smtClean="0"/>
-              <a:pPr/>
-              <a:t>Tuesday, December 16, 2014</a:t>
+              <a:t>Thursday, December 18, 2014</a:t>
             </a:fld>
             <a:endParaRPr lang="en-US"/>
           </a:p>
@@ -4029,10 +4022,9 @@
             <a:extLst/>
           </a:lstStyle>
           <a:p>
-            <a:fld id="{084827A3-B249-4F87-AB1A-1E06AC1AA2A4}" type="datetime2">
+            <a:fld id="{84C15494-40EC-49D1-B16A-5D62AEB1C7F6}" type="datetime2">
               <a:rPr lang="en-US" smtClean="0"/>
-              <a:pPr/>
-              <a:t>Tuesday, December 16, 2014</a:t>
+              <a:t>Thursday, December 18, 2014</a:t>
             </a:fld>
             <a:endParaRPr lang="en-US"/>
           </a:p>
@@ -4152,10 +4144,9 @@
             <a:extLst/>
           </a:lstStyle>
           <a:p>
-            <a:fld id="{B1546142-29B2-49CC-BCC6-A3AD70B4960E}" type="datetime2">
+            <a:fld id="{0E69CF28-AAA5-4213-ADB6-0CAED030067F}" type="datetime2">
               <a:rPr lang="en-US" smtClean="0"/>
-              <a:pPr/>
-              <a:t>Tuesday, December 16, 2014</a:t>
+              <a:t>Thursday, December 18, 2014</a:t>
             </a:fld>
             <a:endParaRPr lang="en-US"/>
           </a:p>
@@ -4428,10 +4419,9 @@
             <a:extLst/>
           </a:lstStyle>
           <a:p>
-            <a:fld id="{E86C4691-4882-40A8-AF62-8CF6A18D40B2}" type="datetime2">
+            <a:fld id="{2D820A96-30EC-4F97-A6FE-A22139420B88}" type="datetime2">
               <a:rPr lang="en-US" smtClean="0"/>
-              <a:pPr/>
-              <a:t>Tuesday, December 16, 2014</a:t>
+              <a:t>Thursday, December 18, 2014</a:t>
             </a:fld>
             <a:endParaRPr lang="en-US"/>
           </a:p>
@@ -4635,10 +4625,9 @@
             <a:extLst/>
           </a:lstStyle>
           <a:p>
-            <a:fld id="{61C6776A-4DEC-47EE-8A49-2C150ECB5465}" type="datetime2">
+            <a:fld id="{DED189F2-7969-4980-AAE5-90265118BBF3}" type="datetime2">
               <a:rPr lang="en-US" smtClean="0"/>
-              <a:pPr/>
-              <a:t>Tuesday, December 16, 2014</a:t>
+              <a:t>Thursday, December 18, 2014</a:t>
             </a:fld>
             <a:endParaRPr lang="en-US">
               <a:solidFill>
@@ -5758,10 +5747,9 @@
             <a:extLst/>
           </a:lstStyle>
           <a:p>
-            <a:fld id="{D10E14BF-C004-4398-9186-5EE680724D95}" type="datetime2">
+            <a:fld id="{380C900C-90F1-4A54-8EB5-CE5024070075}" type="datetime2">
               <a:rPr lang="en-US" smtClean="0"/>
-              <a:pPr/>
-              <a:t>Tuesday, December 16, 2014</a:t>
+              <a:t>Thursday, December 18, 2014</a:t>
             </a:fld>
             <a:endParaRPr lang="en-US" sz="1000" dirty="0">
               <a:solidFill>
@@ -5879,6 +5867,7 @@
     <p:sldLayoutId id="2147483668" r:id="rId10"/>
     <p:sldLayoutId id="2147483669" r:id="rId11"/>
   </p:sldLayoutIdLst>
+  <p:hf hdr="0" ftr="0" dt="0"/>
   <p:txStyles>
     <p:titleStyle>
       <a:lvl1pPr algn="l" rtl="0" eaLnBrk="1" latinLnBrk="0" hangingPunct="1">
@@ -6446,6 +6435,34 @@
           </a:p>
         </p:txBody>
       </p:sp>
+      <p:sp>
+        <p:nvSpPr>
+          <p:cNvPr id="5" name="Zástupný symbol čísla snímky 4"/>
+          <p:cNvSpPr>
+            <a:spLocks noGrp="1"/>
+          </p:cNvSpPr>
+          <p:nvPr>
+            <p:ph type="sldNum" sz="quarter" idx="12"/>
+          </p:nvPr>
+        </p:nvSpPr>
+        <p:spPr/>
+        <p:txBody>
+          <a:bodyPr/>
+          <a:lstStyle/>
+          <a:p>
+            <a:fld id="{45292C34-3E5E-4BA5-AF54-F1601B144FB0}" type="slidenum">
+              <a:rPr lang="en-US" smtClean="0"/>
+              <a:pPr/>
+              <a:t>1</a:t>
+            </a:fld>
+            <a:endParaRPr lang="en-US" dirty="0">
+              <a:solidFill>
+                <a:srgbClr val="FFFFFF"/>
+              </a:solidFill>
+            </a:endParaRPr>
+          </a:p>
+        </p:txBody>
+      </p:sp>
     </p:spTree>
   </p:cSld>
   <p:clrMapOvr>
@@ -6507,59 +6524,249 @@
           </a:p>
         </p:txBody>
       </p:sp>
-      <p:sp>
-        <p:nvSpPr>
-          <p:cNvPr id="3" name="Rectangle 2"/>
-          <p:cNvSpPr>
-            <a:spLocks noGrp="1"/>
-          </p:cNvSpPr>
-          <p:nvPr>
-            <p:ph idx="1"/>
-          </p:nvPr>
-        </p:nvSpPr>
-        <p:spPr>
-          <a:xfrm>
-            <a:off x="457200" y="1368426"/>
-            <a:ext cx="8229600" cy="4525963"/>
-          </a:xfrm>
-        </p:spPr>
-        <p:txBody>
-          <a:bodyPr/>
-          <a:lstStyle/>
-          <a:p>
-            <a:pPr>
-              <a:lnSpc>
-                <a:spcPct val="150000"/>
-              </a:lnSpc>
-            </a:pPr>
-            <a:r>
-              <a:rPr lang="sk-SK" dirty="0"/>
-              <a:t>Algoritmus </a:t>
-            </a:r>
-            <a:r>
-              <a:rPr lang="sk-SK" dirty="0" smtClean="0"/>
-              <a:t>radenia.</a:t>
-            </a:r>
-          </a:p>
-          <a:p>
-            <a:pPr>
-              <a:lnSpc>
-                <a:spcPct val="150000"/>
-              </a:lnSpc>
-            </a:pPr>
-            <a:r>
-              <a:rPr lang="sk-SK" dirty="0" smtClean="0"/>
-              <a:t>Nestabilný</a:t>
-            </a:r>
-          </a:p>
-          <a:p>
-            <a:endParaRPr lang="sk-SK" dirty="0" smtClean="0"/>
-          </a:p>
-          <a:p>
-            <a:endParaRPr lang="sk-SK" dirty="0"/>
-          </a:p>
-        </p:txBody>
-      </p:sp>
+      <mc:AlternateContent xmlns:mc="http://schemas.openxmlformats.org/markup-compatibility/2006">
+        <mc:Choice xmlns:a14="http://schemas.microsoft.com/office/drawing/2010/main" Requires="a14">
+          <p:sp>
+            <p:nvSpPr>
+              <p:cNvPr id="3" name="Rectangle 2"/>
+              <p:cNvSpPr>
+                <a:spLocks noGrp="1"/>
+              </p:cNvSpPr>
+              <p:nvPr>
+                <p:ph idx="1"/>
+              </p:nvPr>
+            </p:nvSpPr>
+            <p:spPr>
+              <a:xfrm>
+                <a:off x="457200" y="1368426"/>
+                <a:ext cx="8229600" cy="4525963"/>
+              </a:xfrm>
+            </p:spPr>
+            <p:txBody>
+              <a:bodyPr/>
+              <a:lstStyle/>
+              <a:p>
+                <a:pPr>
+                  <a:lnSpc>
+                    <a:spcPct val="150000"/>
+                  </a:lnSpc>
+                </a:pPr>
+                <a:r>
+                  <a:rPr lang="sk-SK" dirty="0" smtClean="0"/>
+                  <a:t>Algoritmus </a:t>
+                </a:r>
+                <a:r>
+                  <a:rPr lang="sk-SK" dirty="0" smtClean="0"/>
+                  <a:t>radenia.</a:t>
+                </a:r>
+              </a:p>
+              <a:p>
+                <a:pPr>
+                  <a:lnSpc>
+                    <a:spcPct val="150000"/>
+                  </a:lnSpc>
+                </a:pPr>
+                <a:r>
+                  <a:rPr lang="sk-SK" dirty="0" smtClean="0"/>
+                  <a:t>Nestabilný</a:t>
+                </a:r>
+              </a:p>
+              <a:p>
+                <a:pPr>
+                  <a:lnSpc>
+                    <a:spcPct val="150000"/>
+                  </a:lnSpc>
+                </a:pPr>
+                <a:r>
+                  <a:rPr lang="sk-SK" dirty="0" smtClean="0"/>
+                  <a:t>Neprirodzený</a:t>
+                </a:r>
+                <a:endParaRPr lang="sk-SK" dirty="0"/>
+              </a:p>
+              <a:p>
+                <a:pPr>
+                  <a:lnSpc>
+                    <a:spcPct val="150000"/>
+                  </a:lnSpc>
+                </a:pPr>
+                <a14:m>
+                  <m:oMath xmlns:m="http://schemas.openxmlformats.org/officeDocument/2006/math">
+                    <m:r>
+                      <a:rPr lang="sk-SK" b="0" i="1" smtClean="0">
+                        <a:latin typeface="Cambria Math" panose="02040503050406030204" pitchFamily="18" charset="0"/>
+                      </a:rPr>
+                      <m:t>𝑂</m:t>
+                    </m:r>
+                    <m:r>
+                      <a:rPr lang="sk-SK" b="0" i="1" smtClean="0">
+                        <a:latin typeface="Cambria Math" panose="02040503050406030204" pitchFamily="18" charset="0"/>
+                      </a:rPr>
+                      <m:t>(</m:t>
+                    </m:r>
+                    <m:r>
+                      <a:rPr lang="sk-SK" b="0" i="1" smtClean="0">
+                        <a:latin typeface="Cambria Math" panose="02040503050406030204" pitchFamily="18" charset="0"/>
+                      </a:rPr>
+                      <m:t>𝑛</m:t>
+                    </m:r>
+                    <m:r>
+                      <a:rPr lang="sk-SK" b="0" i="1" smtClean="0">
+                        <a:latin typeface="Cambria Math" panose="02040503050406030204" pitchFamily="18" charset="0"/>
+                      </a:rPr>
+                      <m:t>∗</m:t>
+                    </m:r>
+                    <m:func>
+                      <m:funcPr>
+                        <m:ctrlPr>
+                          <a:rPr lang="sk-SK" b="0" i="1" smtClean="0">
+                            <a:latin typeface="Cambria Math" panose="02040503050406030204" pitchFamily="18" charset="0"/>
+                          </a:rPr>
+                        </m:ctrlPr>
+                      </m:funcPr>
+                      <m:fName>
+                        <m:r>
+                          <m:rPr>
+                            <m:sty m:val="p"/>
+                          </m:rPr>
+                          <a:rPr lang="sk-SK" b="0" i="0" smtClean="0">
+                            <a:latin typeface="Cambria Math" panose="02040503050406030204" pitchFamily="18" charset="0"/>
+                          </a:rPr>
+                          <m:t>log</m:t>
+                        </m:r>
+                      </m:fName>
+                      <m:e>
+                        <m:r>
+                          <a:rPr lang="sk-SK" b="0" i="1" smtClean="0">
+                            <a:latin typeface="Cambria Math" panose="02040503050406030204" pitchFamily="18" charset="0"/>
+                          </a:rPr>
+                          <m:t>𝑛</m:t>
+                        </m:r>
+                      </m:e>
+                    </m:func>
+                    <m:r>
+                      <a:rPr lang="sk-SK" b="0" i="1" smtClean="0">
+                        <a:latin typeface="Cambria Math" panose="02040503050406030204" pitchFamily="18" charset="0"/>
+                      </a:rPr>
+                      <m:t>)</m:t>
+                    </m:r>
+                  </m:oMath>
+                </a14:m>
+                <a:endParaRPr lang="sk-SK" dirty="0" smtClean="0"/>
+              </a:p>
+              <a:p>
+                <a:pPr>
+                  <a:lnSpc>
+                    <a:spcPct val="150000"/>
+                  </a:lnSpc>
+                </a:pPr>
+                <a:r>
+                  <a:rPr lang="sk-SK" dirty="0" smtClean="0"/>
+                  <a:t>Popr. </a:t>
+                </a:r>
+                <a14:m>
+                  <m:oMath xmlns:m="http://schemas.openxmlformats.org/officeDocument/2006/math">
+                    <m:r>
+                      <a:rPr lang="sk-SK" i="1">
+                        <a:latin typeface="Cambria Math" panose="02040503050406030204" pitchFamily="18" charset="0"/>
+                      </a:rPr>
+                      <m:t>𝑂</m:t>
+                    </m:r>
+                    <m:r>
+                      <a:rPr lang="sk-SK" i="1">
+                        <a:latin typeface="Cambria Math" panose="02040503050406030204" pitchFamily="18" charset="0"/>
+                      </a:rPr>
+                      <m:t>(</m:t>
+                    </m:r>
+                    <m:sSup>
+                      <m:sSupPr>
+                        <m:ctrlPr>
+                          <a:rPr lang="sk-SK" i="1" smtClean="0">
+                            <a:latin typeface="Cambria Math" panose="02040503050406030204" pitchFamily="18" charset="0"/>
+                          </a:rPr>
+                        </m:ctrlPr>
+                      </m:sSupPr>
+                      <m:e>
+                        <m:r>
+                          <a:rPr lang="sk-SK" b="0" i="1" smtClean="0">
+                            <a:latin typeface="Cambria Math" panose="02040503050406030204" pitchFamily="18" charset="0"/>
+                          </a:rPr>
+                          <m:t>𝑛</m:t>
+                        </m:r>
+                      </m:e>
+                      <m:sup>
+                        <m:r>
+                          <a:rPr lang="sk-SK" b="0" i="1" smtClean="0">
+                            <a:latin typeface="Cambria Math" panose="02040503050406030204" pitchFamily="18" charset="0"/>
+                          </a:rPr>
+                          <m:t>2</m:t>
+                        </m:r>
+                      </m:sup>
+                    </m:sSup>
+                    <m:r>
+                      <a:rPr lang="sk-SK" i="1">
+                        <a:latin typeface="Cambria Math" panose="02040503050406030204" pitchFamily="18" charset="0"/>
+                      </a:rPr>
+                      <m:t>)</m:t>
+                    </m:r>
+                  </m:oMath>
+                </a14:m>
+                <a:endParaRPr lang="sk-SK" dirty="0"/>
+              </a:p>
+              <a:p>
+                <a:pPr>
+                  <a:lnSpc>
+                    <a:spcPct val="150000"/>
+                  </a:lnSpc>
+                </a:pPr>
+                <a:endParaRPr lang="sk-SK" dirty="0" smtClean="0"/>
+              </a:p>
+              <a:p>
+                <a:endParaRPr lang="sk-SK" dirty="0" smtClean="0"/>
+              </a:p>
+              <a:p>
+                <a:endParaRPr lang="sk-SK" dirty="0"/>
+              </a:p>
+            </p:txBody>
+          </p:sp>
+        </mc:Choice>
+        <mc:Fallback>
+          <p:sp>
+            <p:nvSpPr>
+              <p:cNvPr id="3" name="Rectangle 2"/>
+              <p:cNvSpPr>
+                <a:spLocks noGrp="1" noRot="1" noChangeAspect="1" noMove="1" noResize="1" noEditPoints="1" noAdjustHandles="1" noChangeArrowheads="1" noChangeShapeType="1" noTextEdit="1"/>
+              </p:cNvSpPr>
+              <p:nvPr>
+                <p:ph idx="1"/>
+              </p:nvPr>
+            </p:nvSpPr>
+            <p:spPr>
+              <a:xfrm>
+                <a:off x="457200" y="1368426"/>
+                <a:ext cx="8229600" cy="4525963"/>
+              </a:xfrm>
+              <a:blipFill rotWithShape="0">
+                <a:blip r:embed="rId3"/>
+                <a:stretch>
+                  <a:fillRect/>
+                </a:stretch>
+              </a:blipFill>
+            </p:spPr>
+            <p:txBody>
+              <a:bodyPr/>
+              <a:lstStyle/>
+              <a:p>
+                <a:r>
+                  <a:rPr lang="sk-SK">
+                    <a:noFill/>
+                  </a:rPr>
+                  <a:t> </a:t>
+                </a:r>
+              </a:p>
+            </p:txBody>
+          </p:sp>
+        </mc:Fallback>
+      </mc:AlternateContent>
       <p:pic>
         <p:nvPicPr>
           <p:cNvPr id="5" name="Obrázok 4"/>
@@ -6569,14 +6776,14 @@
           <p:nvPr/>
         </p:nvPicPr>
         <p:blipFill>
-          <a:blip r:embed="rId3"/>
+          <a:blip r:embed="rId4"/>
           <a:stretch>
             <a:fillRect/>
           </a:stretch>
         </p:blipFill>
         <p:spPr>
           <a:xfrm>
-            <a:off x="3286125" y="2276872"/>
+            <a:off x="3491880" y="2204864"/>
             <a:ext cx="5436096" cy="4077072"/>
           </a:xfrm>
           <a:prstGeom prst="rect">
@@ -6609,13 +6816,13 @@
             <a:pPr algn="r"/>
             <a:r>
               <a:rPr lang="sk-SK" sz="900" dirty="0">
-                <a:hlinkClick r:id="rId4"/>
+                <a:hlinkClick r:id="rId5"/>
               </a:rPr>
               <a:t>http://www.cs.swarthmore.edu/~</a:t>
             </a:r>
             <a:r>
               <a:rPr lang="sk-SK" sz="900" dirty="0" smtClean="0">
-                <a:hlinkClick r:id="rId4"/>
+                <a:hlinkClick r:id="rId5"/>
               </a:rPr>
               <a:t>soni/cs35/f13/Labs/lab06.html</a:t>
             </a:r>
@@ -6636,6 +6843,30 @@
               <a:t>]</a:t>
             </a:r>
             <a:endParaRPr lang="sk-SK" sz="900" dirty="0"/>
+          </a:p>
+        </p:txBody>
+      </p:sp>
+      <p:sp>
+        <p:nvSpPr>
+          <p:cNvPr id="6" name="Zástupný symbol čísla snímky 5"/>
+          <p:cNvSpPr>
+            <a:spLocks noGrp="1"/>
+          </p:cNvSpPr>
+          <p:nvPr>
+            <p:ph type="sldNum" sz="quarter" idx="12"/>
+          </p:nvPr>
+        </p:nvSpPr>
+        <p:spPr/>
+        <p:txBody>
+          <a:bodyPr/>
+          <a:lstStyle/>
+          <a:p>
+            <a:fld id="{BC410EEA-824F-4D46-AFE7-60426C8C06B0}" type="slidenum">
+              <a:rPr lang="en-US" smtClean="0"/>
+              <a:pPr/>
+              <a:t>10</a:t>
+            </a:fld>
+            <a:endParaRPr lang="en-US"/>
           </a:p>
         </p:txBody>
       </p:sp>
@@ -6713,67 +6944,253 @@
           </a:p>
         </p:txBody>
       </p:sp>
-      <p:sp>
-        <p:nvSpPr>
-          <p:cNvPr id="3" name="Rectangle 2"/>
+      <mc:AlternateContent xmlns:mc="http://schemas.openxmlformats.org/markup-compatibility/2006">
+        <mc:Choice xmlns:a14="http://schemas.microsoft.com/office/drawing/2010/main" Requires="a14">
+          <p:sp>
+            <p:nvSpPr>
+              <p:cNvPr id="3" name="Rectangle 2"/>
+              <p:cNvSpPr>
+                <a:spLocks noGrp="1"/>
+              </p:cNvSpPr>
+              <p:nvPr>
+                <p:ph idx="1"/>
+              </p:nvPr>
+            </p:nvSpPr>
+            <p:spPr>
+              <a:xfrm>
+                <a:off x="448940" y="1336676"/>
+                <a:ext cx="8229600" cy="4525963"/>
+              </a:xfrm>
+            </p:spPr>
+            <p:txBody>
+              <a:bodyPr/>
+              <a:lstStyle/>
+              <a:p>
+                <a:pPr>
+                  <a:lnSpc>
+                    <a:spcPct val="150000"/>
+                  </a:lnSpc>
+                </a:pPr>
+                <a:r>
+                  <a:rPr lang="sk-SK" dirty="0" smtClean="0"/>
+                  <a:t>Vyhľadávanie </a:t>
+                </a:r>
+                <a:r>
+                  <a:rPr lang="sk-SK" dirty="0" err="1" smtClean="0"/>
+                  <a:t>podreťazca</a:t>
+                </a:r>
+                <a:r>
+                  <a:rPr lang="sk-SK" dirty="0" smtClean="0"/>
+                  <a:t>.</a:t>
+                </a:r>
+                <a:endParaRPr lang="sk-SK" dirty="0" smtClean="0"/>
+              </a:p>
+              <a:p>
+                <a:pPr>
+                  <a:lnSpc>
+                    <a:spcPct val="150000"/>
+                  </a:lnSpc>
+                </a:pPr>
+                <a:r>
+                  <a:rPr lang="sk-SK" dirty="0" smtClean="0"/>
+                  <a:t>Časová </a:t>
+                </a:r>
+                <a:r>
+                  <a:rPr lang="sk-SK" dirty="0"/>
+                  <a:t>z</a:t>
+                </a:r>
+                <a:r>
+                  <a:rPr lang="sk-SK" dirty="0" smtClean="0"/>
+                  <a:t>ložitosť: </a:t>
+                </a:r>
+                <a14:m>
+                  <m:oMath xmlns:m="http://schemas.openxmlformats.org/officeDocument/2006/math">
+                    <m:r>
+                      <a:rPr lang="sk-SK" i="1">
+                        <a:latin typeface="Cambria Math" panose="02040503050406030204" pitchFamily="18" charset="0"/>
+                      </a:rPr>
+                      <m:t>𝑂</m:t>
+                    </m:r>
+                    <m:r>
+                      <a:rPr lang="sk-SK" i="1">
+                        <a:latin typeface="Cambria Math" panose="02040503050406030204" pitchFamily="18" charset="0"/>
+                      </a:rPr>
+                      <m:t>(</m:t>
+                    </m:r>
+                    <m:r>
+                      <a:rPr lang="sk-SK" b="0" i="1" smtClean="0">
+                        <a:latin typeface="Cambria Math" panose="02040503050406030204" pitchFamily="18" charset="0"/>
+                      </a:rPr>
+                      <m:t>𝑛</m:t>
+                    </m:r>
+                    <m:r>
+                      <a:rPr lang="sk-SK" i="1">
+                        <a:latin typeface="Cambria Math" panose="02040503050406030204" pitchFamily="18" charset="0"/>
+                      </a:rPr>
+                      <m:t>)</m:t>
+                    </m:r>
+                  </m:oMath>
+                </a14:m>
+                <a:endParaRPr lang="sk-SK" dirty="0"/>
+              </a:p>
+            </p:txBody>
+          </p:sp>
+        </mc:Choice>
+        <mc:Fallback>
+          <p:sp>
+            <p:nvSpPr>
+              <p:cNvPr id="3" name="Rectangle 2"/>
+              <p:cNvSpPr>
+                <a:spLocks noGrp="1" noRot="1" noChangeAspect="1" noMove="1" noResize="1" noEditPoints="1" noAdjustHandles="1" noChangeArrowheads="1" noChangeShapeType="1" noTextEdit="1"/>
+              </p:cNvSpPr>
+              <p:nvPr>
+                <p:ph idx="1"/>
+              </p:nvPr>
+            </p:nvSpPr>
+            <p:spPr>
+              <a:xfrm>
+                <a:off x="448940" y="1336676"/>
+                <a:ext cx="8229600" cy="4525963"/>
+              </a:xfrm>
+              <a:blipFill rotWithShape="0">
+                <a:blip r:embed="rId3"/>
+                <a:stretch>
+                  <a:fillRect/>
+                </a:stretch>
+              </a:blipFill>
+            </p:spPr>
+            <p:txBody>
+              <a:bodyPr/>
+              <a:lstStyle/>
+              <a:p>
+                <a:r>
+                  <a:rPr lang="sk-SK">
+                    <a:noFill/>
+                  </a:rPr>
+                  <a:t> </a:t>
+                </a:r>
+              </a:p>
+            </p:txBody>
+          </p:sp>
+        </mc:Fallback>
+      </mc:AlternateContent>
+      <p:sp>
+        <p:nvSpPr>
+          <p:cNvPr id="6" name="BlokTextu 5"/>
+          <p:cNvSpPr txBox="1"/>
+          <p:nvPr/>
+        </p:nvSpPr>
+        <p:spPr>
+          <a:xfrm>
+            <a:off x="3959424" y="6353944"/>
+            <a:ext cx="5184576" cy="230832"/>
+          </a:xfrm>
+          <a:prstGeom prst="rect">
+            <a:avLst/>
+          </a:prstGeom>
+          <a:noFill/>
+        </p:spPr>
+        <p:txBody>
+          <a:bodyPr wrap="square" rtlCol="0">
+            <a:spAutoFit/>
+          </a:bodyPr>
+          <a:lstStyle/>
+          <a:p>
+            <a:pPr algn="r"/>
+            <a:r>
+              <a:rPr lang="sk-SK" sz="900" dirty="0">
+                <a:hlinkClick r:id="rId4"/>
+              </a:rPr>
+              <a:t>http://</a:t>
+            </a:r>
+            <a:r>
+              <a:rPr lang="sk-SK" sz="900" dirty="0" smtClean="0">
+                <a:hlinkClick r:id="rId4"/>
+              </a:rPr>
+              <a:t>koding4fun.files.wordpress.com/2010/05/kmpexample.jpg</a:t>
+            </a:r>
+            <a:r>
+              <a:rPr lang="sk-SK" sz="900" dirty="0" smtClean="0"/>
+              <a:t> </a:t>
+            </a:r>
+            <a:r>
+              <a:rPr lang="en-US" sz="900" dirty="0" smtClean="0"/>
+              <a:t>[</a:t>
+            </a:r>
+            <a:r>
+              <a:rPr lang="sk-SK" sz="900" dirty="0" smtClean="0"/>
+              <a:t>16.12.2014</a:t>
+            </a:r>
+            <a:r>
+              <a:rPr lang="en-US" sz="900" dirty="0" smtClean="0"/>
+              <a:t>]</a:t>
+            </a:r>
+            <a:endParaRPr lang="sk-SK" sz="900" dirty="0"/>
+          </a:p>
+        </p:txBody>
+      </p:sp>
+      <p:pic>
+        <p:nvPicPr>
+          <p:cNvPr id="1028" name="Picture 4" descr="http://koding4fun.files.wordpress.com/2010/05/kmpexample.jpg"/>
+          <p:cNvPicPr>
+            <a:picLocks noChangeAspect="1" noChangeArrowheads="1"/>
+          </p:cNvPicPr>
+          <p:nvPr/>
+        </p:nvPicPr>
+        <p:blipFill>
+          <a:blip r:embed="rId5">
+            <a:extLst>
+              <a:ext uri="{28A0092B-C50C-407E-A947-70E740481C1C}">
+                <a14:useLocalDpi xmlns:a14="http://schemas.microsoft.com/office/drawing/2010/main" val="0"/>
+              </a:ext>
+            </a:extLst>
+          </a:blip>
+          <a:srcRect/>
+          <a:stretch>
+            <a:fillRect/>
+          </a:stretch>
+        </p:blipFill>
+        <p:spPr bwMode="auto">
+          <a:xfrm>
+            <a:off x="2223480" y="2708920"/>
+            <a:ext cx="4680520" cy="3465104"/>
+          </a:xfrm>
+          <a:prstGeom prst="rect">
+            <a:avLst/>
+          </a:prstGeom>
+          <a:noFill/>
+          <a:extLst>
+            <a:ext uri="{909E8E84-426E-40DD-AFC4-6F175D3DCCD1}">
+              <a14:hiddenFill xmlns:a14="http://schemas.microsoft.com/office/drawing/2010/main">
+                <a:solidFill>
+                  <a:srgbClr val="FFFFFF"/>
+                </a:solidFill>
+              </a14:hiddenFill>
+            </a:ext>
+          </a:extLst>
+        </p:spPr>
+      </p:pic>
+      <p:sp>
+        <p:nvSpPr>
+          <p:cNvPr id="5" name="Zástupný symbol čísla snímky 4"/>
           <p:cNvSpPr>
             <a:spLocks noGrp="1"/>
           </p:cNvSpPr>
           <p:nvPr>
-            <p:ph idx="1"/>
-          </p:nvPr>
-        </p:nvSpPr>
-        <p:spPr>
-          <a:xfrm>
-            <a:off x="448940" y="1336676"/>
-            <a:ext cx="8229600" cy="4525963"/>
-          </a:xfrm>
-        </p:spPr>
+            <p:ph type="sldNum" sz="quarter" idx="12"/>
+          </p:nvPr>
+        </p:nvSpPr>
+        <p:spPr/>
         <p:txBody>
           <a:bodyPr/>
           <a:lstStyle/>
           <a:p>
-            <a:pPr>
-              <a:lnSpc>
-                <a:spcPct val="150000"/>
-              </a:lnSpc>
-            </a:pPr>
-            <a:r>
-              <a:rPr lang="sk-SK" dirty="0" smtClean="0"/>
-              <a:t>Vyhľadávanie </a:t>
-            </a:r>
-            <a:r>
-              <a:rPr lang="sk-SK" dirty="0" err="1" smtClean="0"/>
-              <a:t>podreťazca</a:t>
-            </a:r>
-            <a:endParaRPr lang="sk-SK" dirty="0" smtClean="0"/>
-          </a:p>
-          <a:p>
-            <a:pPr>
-              <a:lnSpc>
-                <a:spcPct val="150000"/>
-              </a:lnSpc>
-            </a:pPr>
-            <a:r>
-              <a:rPr lang="sk-SK" dirty="0" smtClean="0"/>
-              <a:t>Časová </a:t>
-            </a:r>
-            <a:r>
-              <a:rPr lang="sk-SK" dirty="0"/>
-              <a:t>z</a:t>
-            </a:r>
-            <a:r>
-              <a:rPr lang="sk-SK" dirty="0" smtClean="0"/>
-              <a:t>ložitosť: </a:t>
-            </a:r>
-            <a:r>
-              <a:rPr lang="el-GR" dirty="0" smtClean="0"/>
-              <a:t>Ο</a:t>
-            </a:r>
-            <a:r>
-              <a:rPr lang="sk-SK" dirty="0" smtClean="0"/>
-              <a:t>(n)</a:t>
-            </a:r>
+            <a:fld id="{BC410EEA-824F-4D46-AFE7-60426C8C06B0}" type="slidenum">
+              <a:rPr lang="en-US" smtClean="0"/>
+              <a:pPr/>
+              <a:t>11</a:t>
+            </a:fld>
+            <a:endParaRPr lang="en-US"/>
           </a:p>
         </p:txBody>
       </p:sp>
@@ -6816,6 +7233,44 @@
       </p:grpSpPr>
       <p:sp>
         <p:nvSpPr>
+          <p:cNvPr id="14" name="Obdĺžnik 13"/>
+          <p:cNvSpPr/>
+          <p:nvPr/>
+        </p:nvSpPr>
+        <p:spPr>
+          <a:xfrm>
+            <a:off x="3276164" y="4659254"/>
+            <a:ext cx="864096" cy="432048"/>
+          </a:xfrm>
+          <a:prstGeom prst="rect">
+            <a:avLst/>
+          </a:prstGeom>
+        </p:spPr>
+        <p:style>
+          <a:lnRef idx="1">
+            <a:schemeClr val="accent1"/>
+          </a:lnRef>
+          <a:fillRef idx="2">
+            <a:schemeClr val="accent1"/>
+          </a:fillRef>
+          <a:effectRef idx="1">
+            <a:schemeClr val="accent1"/>
+          </a:effectRef>
+          <a:fontRef idx="minor">
+            <a:schemeClr val="dk1"/>
+          </a:fontRef>
+        </p:style>
+        <p:txBody>
+          <a:bodyPr rtlCol="0" anchor="ctr"/>
+          <a:lstStyle/>
+          <a:p>
+            <a:pPr algn="ctr"/>
+            <a:endParaRPr lang="sk-SK" dirty="0"/>
+          </a:p>
+        </p:txBody>
+      </p:sp>
+      <p:sp>
+        <p:nvSpPr>
           <p:cNvPr id="2" name="Rectangle 1"/>
           <p:cNvSpPr>
             <a:spLocks noGrp="1"/>
@@ -6893,6 +7348,469 @@
               <a:rPr lang="sk-SK" dirty="0" smtClean="0"/>
               <a:t>Realizované pomocou poľa ukazovateľov na jednosmerne viazané zoznamy</a:t>
             </a:r>
+          </a:p>
+        </p:txBody>
+      </p:sp>
+      <p:sp>
+        <p:nvSpPr>
+          <p:cNvPr id="4" name="Zástupný symbol čísla snímky 3"/>
+          <p:cNvSpPr>
+            <a:spLocks noGrp="1"/>
+          </p:cNvSpPr>
+          <p:nvPr>
+            <p:ph type="sldNum" sz="quarter" idx="12"/>
+          </p:nvPr>
+        </p:nvSpPr>
+        <p:spPr/>
+        <p:txBody>
+          <a:bodyPr/>
+          <a:lstStyle/>
+          <a:p>
+            <a:fld id="{BC410EEA-824F-4D46-AFE7-60426C8C06B0}" type="slidenum">
+              <a:rPr lang="en-US" smtClean="0"/>
+              <a:pPr/>
+              <a:t>12</a:t>
+            </a:fld>
+            <a:endParaRPr lang="en-US"/>
+          </a:p>
+        </p:txBody>
+      </p:sp>
+      <p:sp>
+        <p:nvSpPr>
+          <p:cNvPr id="5" name="Obdĺžnik 4"/>
+          <p:cNvSpPr/>
+          <p:nvPr/>
+        </p:nvSpPr>
+        <p:spPr>
+          <a:xfrm>
+            <a:off x="1837184" y="4013221"/>
+            <a:ext cx="864096" cy="432048"/>
+          </a:xfrm>
+          <a:prstGeom prst="rect">
+            <a:avLst/>
+          </a:prstGeom>
+        </p:spPr>
+        <p:style>
+          <a:lnRef idx="1">
+            <a:schemeClr val="accent1"/>
+          </a:lnRef>
+          <a:fillRef idx="2">
+            <a:schemeClr val="accent1"/>
+          </a:fillRef>
+          <a:effectRef idx="1">
+            <a:schemeClr val="accent1"/>
+          </a:effectRef>
+          <a:fontRef idx="minor">
+            <a:schemeClr val="dk1"/>
+          </a:fontRef>
+        </p:style>
+        <p:txBody>
+          <a:bodyPr rtlCol="0" anchor="ctr"/>
+          <a:lstStyle/>
+          <a:p>
+            <a:pPr algn="ctr"/>
+            <a:endParaRPr lang="sk-SK" dirty="0"/>
+          </a:p>
+        </p:txBody>
+      </p:sp>
+      <p:sp>
+        <p:nvSpPr>
+          <p:cNvPr id="7" name="Obdĺžnik 6"/>
+          <p:cNvSpPr/>
+          <p:nvPr/>
+        </p:nvSpPr>
+        <p:spPr>
+          <a:xfrm>
+            <a:off x="1837184" y="4443230"/>
+            <a:ext cx="864096" cy="432048"/>
+          </a:xfrm>
+          <a:prstGeom prst="rect">
+            <a:avLst/>
+          </a:prstGeom>
+        </p:spPr>
+        <p:style>
+          <a:lnRef idx="1">
+            <a:schemeClr val="accent1"/>
+          </a:lnRef>
+          <a:fillRef idx="2">
+            <a:schemeClr val="accent1"/>
+          </a:fillRef>
+          <a:effectRef idx="1">
+            <a:schemeClr val="accent1"/>
+          </a:effectRef>
+          <a:fontRef idx="minor">
+            <a:schemeClr val="dk1"/>
+          </a:fontRef>
+        </p:style>
+        <p:txBody>
+          <a:bodyPr rtlCol="0" anchor="ctr"/>
+          <a:lstStyle/>
+          <a:p>
+            <a:pPr algn="ctr"/>
+            <a:endParaRPr lang="sk-SK" dirty="0"/>
+          </a:p>
+        </p:txBody>
+      </p:sp>
+      <p:sp>
+        <p:nvSpPr>
+          <p:cNvPr id="6" name="Obdĺžnik 5"/>
+          <p:cNvSpPr/>
+          <p:nvPr/>
+        </p:nvSpPr>
+        <p:spPr>
+          <a:xfrm>
+            <a:off x="1837184" y="4873239"/>
+            <a:ext cx="864096" cy="432048"/>
+          </a:xfrm>
+          <a:prstGeom prst="rect">
+            <a:avLst/>
+          </a:prstGeom>
+        </p:spPr>
+        <p:style>
+          <a:lnRef idx="1">
+            <a:schemeClr val="accent1"/>
+          </a:lnRef>
+          <a:fillRef idx="2">
+            <a:schemeClr val="accent1"/>
+          </a:fillRef>
+          <a:effectRef idx="1">
+            <a:schemeClr val="accent1"/>
+          </a:effectRef>
+          <a:fontRef idx="minor">
+            <a:schemeClr val="dk1"/>
+          </a:fontRef>
+        </p:style>
+        <p:txBody>
+          <a:bodyPr rtlCol="0" anchor="ctr"/>
+          <a:lstStyle/>
+          <a:p>
+            <a:pPr algn="ctr"/>
+            <a:endParaRPr lang="sk-SK" dirty="0"/>
+          </a:p>
+        </p:txBody>
+      </p:sp>
+      <p:sp>
+        <p:nvSpPr>
+          <p:cNvPr id="8" name="Obdĺžnik 7"/>
+          <p:cNvSpPr/>
+          <p:nvPr/>
+        </p:nvSpPr>
+        <p:spPr>
+          <a:xfrm>
+            <a:off x="1837184" y="5303248"/>
+            <a:ext cx="864096" cy="432048"/>
+          </a:xfrm>
+          <a:prstGeom prst="rect">
+            <a:avLst/>
+          </a:prstGeom>
+        </p:spPr>
+        <p:style>
+          <a:lnRef idx="1">
+            <a:schemeClr val="accent1"/>
+          </a:lnRef>
+          <a:fillRef idx="2">
+            <a:schemeClr val="accent1"/>
+          </a:fillRef>
+          <a:effectRef idx="1">
+            <a:schemeClr val="accent1"/>
+          </a:effectRef>
+          <a:fontRef idx="minor">
+            <a:schemeClr val="dk1"/>
+          </a:fontRef>
+        </p:style>
+        <p:txBody>
+          <a:bodyPr rtlCol="0" anchor="ctr"/>
+          <a:lstStyle/>
+          <a:p>
+            <a:pPr algn="ctr"/>
+            <a:endParaRPr lang="sk-SK" dirty="0"/>
+          </a:p>
+        </p:txBody>
+      </p:sp>
+      <p:sp>
+        <p:nvSpPr>
+          <p:cNvPr id="10" name="Obdĺžnik 9"/>
+          <p:cNvSpPr/>
+          <p:nvPr/>
+        </p:nvSpPr>
+        <p:spPr>
+          <a:xfrm>
+            <a:off x="1835696" y="5733256"/>
+            <a:ext cx="864096" cy="432048"/>
+          </a:xfrm>
+          <a:prstGeom prst="rect">
+            <a:avLst/>
+          </a:prstGeom>
+        </p:spPr>
+        <p:style>
+          <a:lnRef idx="1">
+            <a:schemeClr val="accent1"/>
+          </a:lnRef>
+          <a:fillRef idx="2">
+            <a:schemeClr val="accent1"/>
+          </a:fillRef>
+          <a:effectRef idx="1">
+            <a:schemeClr val="accent1"/>
+          </a:effectRef>
+          <a:fontRef idx="minor">
+            <a:schemeClr val="dk1"/>
+          </a:fontRef>
+        </p:style>
+        <p:txBody>
+          <a:bodyPr rtlCol="0" anchor="ctr"/>
+          <a:lstStyle/>
+          <a:p>
+            <a:pPr algn="ctr"/>
+            <a:endParaRPr lang="sk-SK" dirty="0"/>
+          </a:p>
+        </p:txBody>
+      </p:sp>
+      <p:cxnSp>
+        <p:nvCxnSpPr>
+          <p:cNvPr id="12" name="Zaoblená spojnica 11"/>
+          <p:cNvCxnSpPr>
+            <a:stCxn id="6" idx="3"/>
+            <a:endCxn id="14" idx="1"/>
+          </p:cNvCxnSpPr>
+          <p:nvPr/>
+        </p:nvCxnSpPr>
+        <p:spPr>
+          <a:xfrm flipV="1">
+            <a:off x="2701280" y="4875278"/>
+            <a:ext cx="574884" cy="213985"/>
+          </a:xfrm>
+          <a:prstGeom prst="curvedConnector3">
+            <a:avLst/>
+          </a:prstGeom>
+          <a:ln>
+            <a:tailEnd type="triangle"/>
+          </a:ln>
+        </p:spPr>
+        <p:style>
+          <a:lnRef idx="2">
+            <a:schemeClr val="accent1"/>
+          </a:lnRef>
+          <a:fillRef idx="0">
+            <a:schemeClr val="accent1"/>
+          </a:fillRef>
+          <a:effectRef idx="1">
+            <a:schemeClr val="accent1"/>
+          </a:effectRef>
+          <a:fontRef idx="minor">
+            <a:schemeClr val="tx1"/>
+          </a:fontRef>
+        </p:style>
+      </p:cxnSp>
+      <p:cxnSp>
+        <p:nvCxnSpPr>
+          <p:cNvPr id="15" name="Zaoblená spojnica 14"/>
+          <p:cNvCxnSpPr>
+            <a:stCxn id="14" idx="3"/>
+            <a:endCxn id="20" idx="1"/>
+          </p:cNvCxnSpPr>
+          <p:nvPr/>
+        </p:nvCxnSpPr>
+        <p:spPr>
+          <a:xfrm>
+            <a:off x="4140260" y="4875278"/>
+            <a:ext cx="601787" cy="202330"/>
+          </a:xfrm>
+          <a:prstGeom prst="curvedConnector3">
+            <a:avLst/>
+          </a:prstGeom>
+          <a:ln>
+            <a:tailEnd type="triangle"/>
+          </a:ln>
+        </p:spPr>
+        <p:style>
+          <a:lnRef idx="2">
+            <a:schemeClr val="accent1"/>
+          </a:lnRef>
+          <a:fillRef idx="0">
+            <a:schemeClr val="accent1"/>
+          </a:fillRef>
+          <a:effectRef idx="1">
+            <a:schemeClr val="accent1"/>
+          </a:effectRef>
+          <a:fontRef idx="minor">
+            <a:schemeClr val="tx1"/>
+          </a:fontRef>
+        </p:style>
+      </p:cxnSp>
+      <p:sp>
+        <p:nvSpPr>
+          <p:cNvPr id="20" name="Obdĺžnik 19"/>
+          <p:cNvSpPr/>
+          <p:nvPr/>
+        </p:nvSpPr>
+        <p:spPr>
+          <a:xfrm>
+            <a:off x="4742047" y="4861584"/>
+            <a:ext cx="864096" cy="432048"/>
+          </a:xfrm>
+          <a:prstGeom prst="rect">
+            <a:avLst/>
+          </a:prstGeom>
+        </p:spPr>
+        <p:style>
+          <a:lnRef idx="1">
+            <a:schemeClr val="accent1"/>
+          </a:lnRef>
+          <a:fillRef idx="2">
+            <a:schemeClr val="accent1"/>
+          </a:fillRef>
+          <a:effectRef idx="1">
+            <a:schemeClr val="accent1"/>
+          </a:effectRef>
+          <a:fontRef idx="minor">
+            <a:schemeClr val="dk1"/>
+          </a:fontRef>
+        </p:style>
+        <p:txBody>
+          <a:bodyPr rtlCol="0" anchor="ctr"/>
+          <a:lstStyle/>
+          <a:p>
+            <a:pPr algn="ctr"/>
+            <a:endParaRPr lang="sk-SK" dirty="0"/>
+          </a:p>
+        </p:txBody>
+      </p:sp>
+      <p:cxnSp>
+        <p:nvCxnSpPr>
+          <p:cNvPr id="25" name="Zaoblená spojnica 24"/>
+          <p:cNvCxnSpPr>
+            <a:stCxn id="20" idx="3"/>
+            <a:endCxn id="26" idx="1"/>
+          </p:cNvCxnSpPr>
+          <p:nvPr/>
+        </p:nvCxnSpPr>
+        <p:spPr>
+          <a:xfrm flipV="1">
+            <a:off x="5606143" y="4875278"/>
+            <a:ext cx="667118" cy="202330"/>
+          </a:xfrm>
+          <a:prstGeom prst="curvedConnector3">
+            <a:avLst/>
+          </a:prstGeom>
+          <a:ln>
+            <a:tailEnd type="triangle"/>
+          </a:ln>
+        </p:spPr>
+        <p:style>
+          <a:lnRef idx="2">
+            <a:schemeClr val="accent1"/>
+          </a:lnRef>
+          <a:fillRef idx="0">
+            <a:schemeClr val="accent1"/>
+          </a:fillRef>
+          <a:effectRef idx="1">
+            <a:schemeClr val="accent1"/>
+          </a:effectRef>
+          <a:fontRef idx="minor">
+            <a:schemeClr val="tx1"/>
+          </a:fontRef>
+        </p:style>
+      </p:cxnSp>
+      <p:sp>
+        <p:nvSpPr>
+          <p:cNvPr id="26" name="Obdĺžnik 25"/>
+          <p:cNvSpPr/>
+          <p:nvPr/>
+        </p:nvSpPr>
+        <p:spPr>
+          <a:xfrm>
+            <a:off x="6273261" y="4659254"/>
+            <a:ext cx="864096" cy="432048"/>
+          </a:xfrm>
+          <a:prstGeom prst="rect">
+            <a:avLst/>
+          </a:prstGeom>
+        </p:spPr>
+        <p:style>
+          <a:lnRef idx="1">
+            <a:schemeClr val="accent1"/>
+          </a:lnRef>
+          <a:fillRef idx="2">
+            <a:schemeClr val="accent1"/>
+          </a:fillRef>
+          <a:effectRef idx="1">
+            <a:schemeClr val="accent1"/>
+          </a:effectRef>
+          <a:fontRef idx="minor">
+            <a:schemeClr val="dk1"/>
+          </a:fontRef>
+        </p:style>
+        <p:txBody>
+          <a:bodyPr rtlCol="0" anchor="ctr"/>
+          <a:lstStyle/>
+          <a:p>
+            <a:pPr algn="ctr"/>
+            <a:endParaRPr lang="sk-SK" dirty="0"/>
+          </a:p>
+        </p:txBody>
+      </p:sp>
+      <p:cxnSp>
+        <p:nvCxnSpPr>
+          <p:cNvPr id="36" name="Zaoblená spojnica 35"/>
+          <p:cNvCxnSpPr>
+            <a:stCxn id="26" idx="3"/>
+          </p:cNvCxnSpPr>
+          <p:nvPr/>
+        </p:nvCxnSpPr>
+        <p:spPr>
+          <a:xfrm>
+            <a:off x="7137357" y="4875278"/>
+            <a:ext cx="489448" cy="12700"/>
+          </a:xfrm>
+          <a:prstGeom prst="curvedConnector3">
+            <a:avLst/>
+          </a:prstGeom>
+          <a:ln>
+            <a:tailEnd type="triangle"/>
+          </a:ln>
+        </p:spPr>
+        <p:style>
+          <a:lnRef idx="2">
+            <a:schemeClr val="accent1"/>
+          </a:lnRef>
+          <a:fillRef idx="0">
+            <a:schemeClr val="accent1"/>
+          </a:fillRef>
+          <a:effectRef idx="1">
+            <a:schemeClr val="accent1"/>
+          </a:effectRef>
+          <a:fontRef idx="minor">
+            <a:schemeClr val="tx1"/>
+          </a:fontRef>
+        </p:style>
+      </p:cxnSp>
+      <p:sp>
+        <p:nvSpPr>
+          <p:cNvPr id="39" name="BlokTextu 38"/>
+          <p:cNvSpPr txBox="1"/>
+          <p:nvPr/>
+        </p:nvSpPr>
+        <p:spPr>
+          <a:xfrm>
+            <a:off x="7743281" y="4861584"/>
+            <a:ext cx="1079014" cy="369332"/>
+          </a:xfrm>
+          <a:prstGeom prst="rect">
+            <a:avLst/>
+          </a:prstGeom>
+          <a:noFill/>
+        </p:spPr>
+        <p:txBody>
+          <a:bodyPr wrap="square" rtlCol="0">
+            <a:spAutoFit/>
+          </a:bodyPr>
+          <a:lstStyle/>
+          <a:p>
+            <a:r>
+              <a:rPr lang="sk-SK" dirty="0" smtClean="0"/>
+              <a:t>...</a:t>
+            </a:r>
+            <a:endParaRPr lang="sk-SK" dirty="0"/>
           </a:p>
         </p:txBody>
       </p:sp>
@@ -6962,6 +7880,30 @@
           </a:p>
         </p:txBody>
       </p:sp>
+      <p:sp>
+        <p:nvSpPr>
+          <p:cNvPr id="3" name="Zástupný symbol čísla snímky 2"/>
+          <p:cNvSpPr>
+            <a:spLocks noGrp="1"/>
+          </p:cNvSpPr>
+          <p:nvPr>
+            <p:ph type="sldNum" sz="quarter" idx="12"/>
+          </p:nvPr>
+        </p:nvSpPr>
+        <p:spPr/>
+        <p:txBody>
+          <a:bodyPr/>
+          <a:lstStyle/>
+          <a:p>
+            <a:fld id="{BC410EEA-824F-4D46-AFE7-60426C8C06B0}" type="slidenum">
+              <a:rPr lang="en-US" smtClean="0"/>
+              <a:pPr/>
+              <a:t>13</a:t>
+            </a:fld>
+            <a:endParaRPr lang="en-US"/>
+          </a:p>
+        </p:txBody>
+      </p:sp>
     </p:spTree>
   </p:cSld>
   <p:clrMapOvr>
@@ -7050,13 +7992,10 @@
               <a:t>Dávid </a:t>
             </a:r>
             <a:r>
-              <a:rPr lang="sk-SK" dirty="0"/>
-              <a:t>Mikuš  (</a:t>
-            </a:r>
-            <a:r>
               <a:rPr lang="sk-SK" dirty="0" smtClean="0"/>
-              <a:t>xmikus15)</a:t>
-            </a:r>
+              <a:t>Mikuš</a:t>
+            </a:r>
+            <a:endParaRPr lang="sk-SK" dirty="0" smtClean="0"/>
           </a:p>
           <a:p>
             <a:pPr>
@@ -7072,10 +8011,6 @@
               <a:rPr lang="sk-SK" dirty="0" err="1" smtClean="0"/>
               <a:t>Hostačný</a:t>
             </a:r>
-            <a:r>
-              <a:rPr lang="sk-SK" dirty="0"/>
-              <a:t>  (xhosta03)</a:t>
-            </a:r>
             <a:endParaRPr lang="sk-SK" dirty="0" smtClean="0"/>
           </a:p>
           <a:p>
@@ -7092,14 +8027,6 @@
               <a:rPr lang="sk-SK" dirty="0" err="1" smtClean="0"/>
               <a:t>Kello</a:t>
             </a:r>
-            <a:r>
-              <a:rPr lang="sk-SK" dirty="0" smtClean="0"/>
-              <a:t> (</a:t>
-            </a:r>
-            <a:r>
-              <a:rPr lang="sk-SK" dirty="0"/>
-              <a:t>xkello00)</a:t>
-            </a:r>
             <a:endParaRPr lang="sk-SK" dirty="0" smtClean="0"/>
           </a:p>
           <a:p>
@@ -7113,12 +8040,8 @@
               <a:t>Adam </a:t>
             </a:r>
             <a:r>
-              <a:rPr lang="sk-SK" dirty="0" err="1"/>
+              <a:rPr lang="sk-SK" dirty="0" err="1" smtClean="0"/>
               <a:t>Lučanský</a:t>
-            </a:r>
-            <a:r>
-              <a:rPr lang="sk-SK" dirty="0"/>
-              <a:t> (xlucan01)</a:t>
             </a:r>
             <a:endParaRPr lang="sk-SK" dirty="0" smtClean="0"/>
           </a:p>
@@ -7133,14 +8056,34 @@
               <a:t>Michaela </a:t>
             </a:r>
             <a:r>
-              <a:rPr lang="sk-SK" dirty="0" err="1"/>
+              <a:rPr lang="sk-SK" dirty="0" err="1" smtClean="0"/>
               <a:t>Lukášová</a:t>
             </a:r>
-            <a:r>
-              <a:rPr lang="sk-SK" dirty="0"/>
-              <a:t> (xlukas09)</a:t>
-            </a:r>
             <a:endParaRPr lang="sk-SK" noProof="0" dirty="0"/>
+          </a:p>
+        </p:txBody>
+      </p:sp>
+      <p:sp>
+        <p:nvSpPr>
+          <p:cNvPr id="4" name="Zástupný symbol čísla snímky 3"/>
+          <p:cNvSpPr>
+            <a:spLocks noGrp="1"/>
+          </p:cNvSpPr>
+          <p:nvPr>
+            <p:ph type="sldNum" sz="quarter" idx="12"/>
+          </p:nvPr>
+        </p:nvSpPr>
+        <p:spPr/>
+        <p:txBody>
+          <a:bodyPr/>
+          <a:lstStyle/>
+          <a:p>
+            <a:fld id="{BC410EEA-824F-4D46-AFE7-60426C8C06B0}" type="slidenum">
+              <a:rPr lang="en-US" smtClean="0"/>
+              <a:pPr/>
+              <a:t>2</a:t>
+            </a:fld>
+            <a:endParaRPr lang="en-US"/>
           </a:p>
         </p:txBody>
       </p:sp>
@@ -7275,7 +8218,30 @@
               <a:rPr lang="sk-SK" dirty="0" smtClean="0"/>
               <a:t>Algoritmy</a:t>
             </a:r>
-            <a:endParaRPr lang="sk-SK" dirty="0" smtClean="0"/>
+          </a:p>
+        </p:txBody>
+      </p:sp>
+      <p:sp>
+        <p:nvSpPr>
+          <p:cNvPr id="4" name="Zástupný symbol čísla snímky 3"/>
+          <p:cNvSpPr>
+            <a:spLocks noGrp="1"/>
+          </p:cNvSpPr>
+          <p:nvPr>
+            <p:ph type="sldNum" sz="quarter" idx="12"/>
+          </p:nvPr>
+        </p:nvSpPr>
+        <p:spPr/>
+        <p:txBody>
+          <a:bodyPr/>
+          <a:lstStyle/>
+          <a:p>
+            <a:fld id="{BC410EEA-824F-4D46-AFE7-60426C8C06B0}" type="slidenum">
+              <a:rPr lang="en-US" smtClean="0"/>
+              <a:pPr/>
+              <a:t>3</a:t>
+            </a:fld>
+            <a:endParaRPr lang="en-US"/>
           </a:p>
         </p:txBody>
       </p:sp>
@@ -7937,6 +8903,30 @@
               <a:ea typeface="Verdana" panose="020B0604030504040204" pitchFamily="34" charset="0"/>
               <a:cs typeface="Verdana" panose="020B0604030504040204" pitchFamily="34" charset="0"/>
             </a:endParaRPr>
+          </a:p>
+        </p:txBody>
+      </p:sp>
+      <p:sp>
+        <p:nvSpPr>
+          <p:cNvPr id="3" name="Zástupný symbol čísla snímky 2"/>
+          <p:cNvSpPr>
+            <a:spLocks noGrp="1"/>
+          </p:cNvSpPr>
+          <p:nvPr>
+            <p:ph type="sldNum" sz="quarter" idx="12"/>
+          </p:nvPr>
+        </p:nvSpPr>
+        <p:spPr/>
+        <p:txBody>
+          <a:bodyPr/>
+          <a:lstStyle/>
+          <a:p>
+            <a:fld id="{BC410EEA-824F-4D46-AFE7-60426C8C06B0}" type="slidenum">
+              <a:rPr lang="en-US" smtClean="0"/>
+              <a:pPr/>
+              <a:t>4</a:t>
+            </a:fld>
+            <a:endParaRPr lang="en-US"/>
           </a:p>
         </p:txBody>
       </p:sp>
@@ -8195,11 +9185,7 @@
             </a:pPr>
             <a:r>
               <a:rPr lang="sk-SK" dirty="0" smtClean="0"/>
-              <a:t>Vektor </a:t>
-            </a:r>
-            <a:r>
-              <a:rPr lang="sk-SK" dirty="0" smtClean="0"/>
-              <a:t>tokenov</a:t>
+              <a:t>Vektor tokenov</a:t>
             </a:r>
           </a:p>
           <a:p>
@@ -8283,6 +9269,30 @@
               <a:t>.pas</a:t>
             </a:r>
             <a:endParaRPr lang="sk-SK" dirty="0"/>
+          </a:p>
+        </p:txBody>
+      </p:sp>
+      <p:sp>
+        <p:nvSpPr>
+          <p:cNvPr id="3" name="Zástupný symbol čísla snímky 2"/>
+          <p:cNvSpPr>
+            <a:spLocks noGrp="1"/>
+          </p:cNvSpPr>
+          <p:nvPr>
+            <p:ph type="sldNum" sz="quarter" idx="12"/>
+          </p:nvPr>
+        </p:nvSpPr>
+        <p:spPr/>
+        <p:txBody>
+          <a:bodyPr/>
+          <a:lstStyle/>
+          <a:p>
+            <a:fld id="{BC410EEA-824F-4D46-AFE7-60426C8C06B0}" type="slidenum">
+              <a:rPr lang="en-US" smtClean="0"/>
+              <a:pPr/>
+              <a:t>5</a:t>
+            </a:fld>
+            <a:endParaRPr lang="en-US"/>
           </a:p>
         </p:txBody>
       </p:sp>
@@ -8627,6 +9637,30 @@
           </a:p>
         </p:txBody>
       </p:sp>
+      <p:sp>
+        <p:nvSpPr>
+          <p:cNvPr id="3" name="Zástupný symbol čísla snímky 2"/>
+          <p:cNvSpPr>
+            <a:spLocks noGrp="1"/>
+          </p:cNvSpPr>
+          <p:nvPr>
+            <p:ph type="sldNum" sz="quarter" idx="12"/>
+          </p:nvPr>
+        </p:nvSpPr>
+        <p:spPr/>
+        <p:txBody>
+          <a:bodyPr/>
+          <a:lstStyle/>
+          <a:p>
+            <a:fld id="{BC410EEA-824F-4D46-AFE7-60426C8C06B0}" type="slidenum">
+              <a:rPr lang="en-US" smtClean="0"/>
+              <a:pPr/>
+              <a:t>6</a:t>
+            </a:fld>
+            <a:endParaRPr lang="en-US"/>
+          </a:p>
+        </p:txBody>
+      </p:sp>
     </p:spTree>
     <p:extLst>
       <p:ext uri="{BB962C8B-B14F-4D97-AF65-F5344CB8AC3E}">
@@ -8828,13 +9862,8 @@
             </a:pPr>
             <a:r>
               <a:rPr lang="sk-SK" dirty="0" smtClean="0"/>
-              <a:t>Inštrukcie sú inšpirované architektúrou x86 (zásobník, </a:t>
-            </a:r>
-            <a:r>
-              <a:rPr lang="sk-SK" dirty="0" smtClean="0"/>
-              <a:t>inštrukcie)</a:t>
-            </a:r>
-            <a:endParaRPr lang="sk-SK" dirty="0" smtClean="0"/>
+              <a:t>Inštrukcie sú inšpirované architektúrou x86 (zásobník, inštrukcie)</a:t>
+            </a:r>
           </a:p>
           <a:p>
             <a:pPr>
@@ -8844,11 +9873,7 @@
             </a:pPr>
             <a:r>
               <a:rPr lang="sk-SK" noProof="0" dirty="0" smtClean="0"/>
-              <a:t>Neobsahuje ukazovateľ na </a:t>
-            </a:r>
-            <a:r>
-              <a:rPr lang="sk-SK" noProof="0" dirty="0" smtClean="0"/>
-              <a:t>vrchol zásobníka (SP)</a:t>
+              <a:t>Neobsahuje ukazovateľ na vrchol zásobníka (SP)</a:t>
             </a:r>
           </a:p>
           <a:p>
@@ -8895,6 +9920,30 @@
           </a:prstGeom>
         </p:spPr>
       </p:pic>
+      <p:sp>
+        <p:nvSpPr>
+          <p:cNvPr id="4" name="Zástupný symbol čísla snímky 3"/>
+          <p:cNvSpPr>
+            <a:spLocks noGrp="1"/>
+          </p:cNvSpPr>
+          <p:nvPr>
+            <p:ph type="sldNum" sz="quarter" idx="12"/>
+          </p:nvPr>
+        </p:nvSpPr>
+        <p:spPr/>
+        <p:txBody>
+          <a:bodyPr/>
+          <a:lstStyle/>
+          <a:p>
+            <a:fld id="{BC410EEA-824F-4D46-AFE7-60426C8C06B0}" type="slidenum">
+              <a:rPr lang="en-US" smtClean="0"/>
+              <a:pPr/>
+              <a:t>7</a:t>
+            </a:fld>
+            <a:endParaRPr lang="en-US"/>
+          </a:p>
+        </p:txBody>
+      </p:sp>
     </p:spTree>
     <p:extLst>
       <p:ext uri="{BB962C8B-B14F-4D97-AF65-F5344CB8AC3E}">
@@ -8945,7 +9994,7 @@
         <p:spPr>
           <a:xfrm>
             <a:off x="0" y="51372"/>
-            <a:ext cx="9011344" cy="1143000"/>
+            <a:ext cx="9144000" cy="1143000"/>
           </a:xfrm>
         </p:spPr>
         <p:txBody>
@@ -8971,25 +10020,7 @@
                 <a:ea typeface="+mj-ea"/>
                 <a:cs typeface="+mj-cs"/>
               </a:rPr>
-              <a:t>Generovanie </a:t>
-            </a:r>
-            <a:r>
-              <a:rPr lang="sk-SK" sz="4100" b="1" kern="1200" noProof="0" dirty="0" smtClean="0">
-                <a:solidFill>
-                  <a:schemeClr val="tx2"/>
-                </a:solidFill>
-                <a:effectLst>
-                  <a:outerShdw blurRad="31750" dist="25400" dir="5400000" algn="tl" rotWithShape="0">
-                    <a:srgbClr val="000000">
-                      <a:alpha val="25000"/>
-                    </a:srgbClr>
-                  </a:outerShdw>
-                </a:effectLst>
-                <a:latin typeface="+mj-lt"/>
-                <a:ea typeface="+mj-ea"/>
-                <a:cs typeface="+mj-cs"/>
-              </a:rPr>
-              <a:t>aritmetických inštrukcií</a:t>
+              <a:t>Generovanie aritmetických inštrukcií</a:t>
             </a:r>
             <a:endParaRPr lang="sk-SK" noProof="0" dirty="0"/>
           </a:p>
@@ -9182,15 +10213,7 @@
                 <a:ea typeface="Verdana" panose="020B0604030504040204" pitchFamily="34" charset="0"/>
                 <a:cs typeface="Verdana" panose="020B0604030504040204" pitchFamily="34" charset="0"/>
               </a:rPr>
-              <a:t>= </a:t>
-            </a:r>
-            <a:r>
-              <a:rPr lang="sk-SK" b="1" dirty="0" smtClean="0">
-                <a:latin typeface="Verdana" panose="020B0604030504040204" pitchFamily="34" charset="0"/>
-                <a:ea typeface="Verdana" panose="020B0604030504040204" pitchFamily="34" charset="0"/>
-                <a:cs typeface="Verdana" panose="020B0604030504040204" pitchFamily="34" charset="0"/>
-              </a:rPr>
-              <a:t>522</a:t>
+              <a:t>= 522</a:t>
             </a:r>
           </a:p>
           <a:p>
@@ -10261,6 +11284,30 @@
               <a:t>SRC 2</a:t>
             </a:r>
             <a:endParaRPr lang="sk-SK" dirty="0"/>
+          </a:p>
+        </p:txBody>
+      </p:sp>
+      <p:sp>
+        <p:nvSpPr>
+          <p:cNvPr id="13" name="Zástupný symbol čísla snímky 12"/>
+          <p:cNvSpPr>
+            <a:spLocks noGrp="1"/>
+          </p:cNvSpPr>
+          <p:nvPr>
+            <p:ph type="sldNum" sz="quarter" idx="12"/>
+          </p:nvPr>
+        </p:nvSpPr>
+        <p:spPr/>
+        <p:txBody>
+          <a:bodyPr/>
+          <a:lstStyle/>
+          <a:p>
+            <a:fld id="{BC410EEA-824F-4D46-AFE7-60426C8C06B0}" type="slidenum">
+              <a:rPr lang="en-US" smtClean="0"/>
+              <a:pPr/>
+              <a:t>8</a:t>
+            </a:fld>
+            <a:endParaRPr lang="en-US"/>
           </a:p>
         </p:txBody>
       </p:sp>
@@ -10308,8 +11355,8 @@
         </p:nvSpPr>
         <p:spPr>
           <a:xfrm>
-            <a:off x="107504" y="84179"/>
-            <a:ext cx="8917741" cy="1143000"/>
+            <a:off x="0" y="84179"/>
+            <a:ext cx="9144000" cy="1143000"/>
           </a:xfrm>
         </p:spPr>
         <p:txBody>
@@ -10335,25 +11382,7 @@
                 <a:ea typeface="+mj-ea"/>
                 <a:cs typeface="+mj-cs"/>
               </a:rPr>
-              <a:t>Generovanie </a:t>
-            </a:r>
-            <a:r>
-              <a:rPr lang="sk-SK" sz="4100" b="1" kern="1200" noProof="0" dirty="0" smtClean="0">
-                <a:solidFill>
-                  <a:schemeClr val="tx2"/>
-                </a:solidFill>
-                <a:effectLst>
-                  <a:outerShdw blurRad="31750" dist="25400" dir="5400000" algn="tl" rotWithShape="0">
-                    <a:srgbClr val="000000">
-                      <a:alpha val="25000"/>
-                    </a:srgbClr>
-                  </a:outerShdw>
-                </a:effectLst>
-                <a:latin typeface="+mj-lt"/>
-                <a:ea typeface="+mj-ea"/>
-                <a:cs typeface="+mj-cs"/>
-              </a:rPr>
-              <a:t>aritmetických inštrukcií</a:t>
+              <a:t>Generovanie aritmetických inštrukcií</a:t>
             </a:r>
             <a:endParaRPr lang="sk-SK" noProof="0" dirty="0"/>
           </a:p>
@@ -11325,6 +12354,30 @@
               <a:t>...</a:t>
             </a:r>
             <a:endParaRPr lang="sk-SK" sz="2400" dirty="0"/>
+          </a:p>
+        </p:txBody>
+      </p:sp>
+      <p:sp>
+        <p:nvSpPr>
+          <p:cNvPr id="3" name="Zástupný symbol čísla snímky 2"/>
+          <p:cNvSpPr>
+            <a:spLocks noGrp="1"/>
+          </p:cNvSpPr>
+          <p:nvPr>
+            <p:ph type="sldNum" sz="quarter" idx="12"/>
+          </p:nvPr>
+        </p:nvSpPr>
+        <p:spPr/>
+        <p:txBody>
+          <a:bodyPr/>
+          <a:lstStyle/>
+          <a:p>
+            <a:fld id="{BC410EEA-824F-4D46-AFE7-60426C8C06B0}" type="slidenum">
+              <a:rPr lang="en-US" smtClean="0"/>
+              <a:pPr/>
+              <a:t>9</a:t>
+            </a:fld>
+            <a:endParaRPr lang="en-US"/>
           </a:p>
         </p:txBody>
       </p:sp>

</xml_diff>

<commit_message>
Obhajoba: Tabulka s rozptylenym polom
</commit_message>
<xml_diff>
--- a/obhajoba/ifj_prezentacia.pptx
+++ b/obhajoba/ifj_prezentacia.pptx
@@ -7124,7 +7124,11 @@
             </a:br>
             <a:r>
               <a:rPr lang="sk-SK" dirty="0" smtClean="0"/>
-              <a:t>Tabuľka s rozptýlenými polom</a:t>
+              <a:t>Tabuľka s rozptýlenými </a:t>
+            </a:r>
+            <a:r>
+              <a:rPr lang="sk-SK" dirty="0" smtClean="0"/>
+              <a:t>položkami</a:t>
             </a:r>
             <a:endParaRPr lang="sk-SK" noProof="0" dirty="0"/>
           </a:p>
@@ -12093,8 +12097,8 @@
           </a:p>
         </p:txBody>
       </p:sp>
-      <mc:AlternateContent xmlns:mc="http://schemas.openxmlformats.org/markup-compatibility/2006" xmlns:a14="http://schemas.microsoft.com/office/drawing/2010/main">
-        <mc:Choice Requires="a14">
+      <mc:AlternateContent xmlns:mc="http://schemas.openxmlformats.org/markup-compatibility/2006">
+        <mc:Choice xmlns:a14="http://schemas.microsoft.com/office/drawing/2010/main" Requires="a14">
           <p:sp>
             <p:nvSpPr>
               <p:cNvPr id="3" name="Rectangle 2"/>
@@ -12294,7 +12298,7 @@
             </p:txBody>
           </p:sp>
         </mc:Choice>
-        <mc:Fallback xmlns="">
+        <mc:Fallback>
           <p:sp>
             <p:nvSpPr>
               <p:cNvPr id="3" name="Rectangle 2"/>

</xml_diff>